<commit_message>
Update new format of poster
</commit_message>
<xml_diff>
--- a/Lab/Poster.pptx
+++ b/Lab/Poster.pptx
@@ -243,7 +243,7 @@
           <a:p>
             <a:fld id="{AACF1CD8-7D76-4BA6-9FA7-2FA0E557EBD4}" type="datetimeFigureOut">
               <a:rPr lang="zh-TW" altLang="en-US" smtClean="0"/>
-              <a:t>2020/12/29</a:t>
+              <a:t>2021/1/4</a:t>
             </a:fld>
             <a:endParaRPr lang="zh-TW" altLang="en-US"/>
           </a:p>
@@ -413,7 +413,7 @@
           <a:p>
             <a:fld id="{AACF1CD8-7D76-4BA6-9FA7-2FA0E557EBD4}" type="datetimeFigureOut">
               <a:rPr lang="zh-TW" altLang="en-US" smtClean="0"/>
-              <a:t>2020/12/29</a:t>
+              <a:t>2021/1/4</a:t>
             </a:fld>
             <a:endParaRPr lang="zh-TW" altLang="en-US"/>
           </a:p>
@@ -593,7 +593,7 @@
           <a:p>
             <a:fld id="{AACF1CD8-7D76-4BA6-9FA7-2FA0E557EBD4}" type="datetimeFigureOut">
               <a:rPr lang="zh-TW" altLang="en-US" smtClean="0"/>
-              <a:t>2020/12/29</a:t>
+              <a:t>2021/1/4</a:t>
             </a:fld>
             <a:endParaRPr lang="zh-TW" altLang="en-US"/>
           </a:p>
@@ -763,7 +763,7 @@
           <a:p>
             <a:fld id="{AACF1CD8-7D76-4BA6-9FA7-2FA0E557EBD4}" type="datetimeFigureOut">
               <a:rPr lang="zh-TW" altLang="en-US" smtClean="0"/>
-              <a:t>2020/12/29</a:t>
+              <a:t>2021/1/4</a:t>
             </a:fld>
             <a:endParaRPr lang="zh-TW" altLang="en-US"/>
           </a:p>
@@ -1007,7 +1007,7 @@
           <a:p>
             <a:fld id="{AACF1CD8-7D76-4BA6-9FA7-2FA0E557EBD4}" type="datetimeFigureOut">
               <a:rPr lang="zh-TW" altLang="en-US" smtClean="0"/>
-              <a:t>2020/12/29</a:t>
+              <a:t>2021/1/4</a:t>
             </a:fld>
             <a:endParaRPr lang="zh-TW" altLang="en-US"/>
           </a:p>
@@ -1239,7 +1239,7 @@
           <a:p>
             <a:fld id="{AACF1CD8-7D76-4BA6-9FA7-2FA0E557EBD4}" type="datetimeFigureOut">
               <a:rPr lang="zh-TW" altLang="en-US" smtClean="0"/>
-              <a:t>2020/12/29</a:t>
+              <a:t>2021/1/4</a:t>
             </a:fld>
             <a:endParaRPr lang="zh-TW" altLang="en-US"/>
           </a:p>
@@ -1606,7 +1606,7 @@
           <a:p>
             <a:fld id="{AACF1CD8-7D76-4BA6-9FA7-2FA0E557EBD4}" type="datetimeFigureOut">
               <a:rPr lang="zh-TW" altLang="en-US" smtClean="0"/>
-              <a:t>2020/12/29</a:t>
+              <a:t>2021/1/4</a:t>
             </a:fld>
             <a:endParaRPr lang="zh-TW" altLang="en-US"/>
           </a:p>
@@ -1724,7 +1724,7 @@
           <a:p>
             <a:fld id="{AACF1CD8-7D76-4BA6-9FA7-2FA0E557EBD4}" type="datetimeFigureOut">
               <a:rPr lang="zh-TW" altLang="en-US" smtClean="0"/>
-              <a:t>2020/12/29</a:t>
+              <a:t>2021/1/4</a:t>
             </a:fld>
             <a:endParaRPr lang="zh-TW" altLang="en-US"/>
           </a:p>
@@ -1819,7 +1819,7 @@
           <a:p>
             <a:fld id="{AACF1CD8-7D76-4BA6-9FA7-2FA0E557EBD4}" type="datetimeFigureOut">
               <a:rPr lang="zh-TW" altLang="en-US" smtClean="0"/>
-              <a:t>2020/12/29</a:t>
+              <a:t>2021/1/4</a:t>
             </a:fld>
             <a:endParaRPr lang="zh-TW" altLang="en-US"/>
           </a:p>
@@ -2096,7 +2096,7 @@
           <a:p>
             <a:fld id="{AACF1CD8-7D76-4BA6-9FA7-2FA0E557EBD4}" type="datetimeFigureOut">
               <a:rPr lang="zh-TW" altLang="en-US" smtClean="0"/>
-              <a:t>2020/12/29</a:t>
+              <a:t>2021/1/4</a:t>
             </a:fld>
             <a:endParaRPr lang="zh-TW" altLang="en-US"/>
           </a:p>
@@ -2353,7 +2353,7 @@
           <a:p>
             <a:fld id="{AACF1CD8-7D76-4BA6-9FA7-2FA0E557EBD4}" type="datetimeFigureOut">
               <a:rPr lang="zh-TW" altLang="en-US" smtClean="0"/>
-              <a:t>2020/12/29</a:t>
+              <a:t>2021/1/4</a:t>
             </a:fld>
             <a:endParaRPr lang="zh-TW" altLang="en-US"/>
           </a:p>
@@ -2566,7 +2566,7 @@
           <a:p>
             <a:fld id="{AACF1CD8-7D76-4BA6-9FA7-2FA0E557EBD4}" type="datetimeFigureOut">
               <a:rPr lang="zh-TW" altLang="en-US" smtClean="0"/>
-              <a:t>2020/12/29</a:t>
+              <a:t>2021/1/4</a:t>
             </a:fld>
             <a:endParaRPr lang="zh-TW" altLang="en-US"/>
           </a:p>
@@ -2985,7 +2985,7 @@
         </p:nvSpPr>
         <p:spPr>
           <a:xfrm>
-            <a:off x="-17896" y="-232188"/>
+            <a:off x="-48263" y="-408426"/>
             <a:ext cx="21635315" cy="30011271"/>
           </a:xfrm>
           <a:prstGeom prst="rect">
@@ -4026,11 +4026,18 @@
           </a:p>
           <a:p>
             <a:r>
+              <a:rPr lang="zh-TW" altLang="en-US" sz="5000">
+                <a:latin typeface="標楷體" panose="03000509000000000000" pitchFamily="65" charset="-120"/>
+                <a:ea typeface="標楷體" panose="03000509000000000000" pitchFamily="65" charset="-120"/>
+              </a:rPr>
+              <a:t>              吳岳霖</a:t>
+            </a:r>
+            <a:r>
               <a:rPr lang="zh-TW" altLang="en-US" sz="5000" dirty="0">
                 <a:latin typeface="標楷體" panose="03000509000000000000" pitchFamily="65" charset="-120"/>
                 <a:ea typeface="標楷體" panose="03000509000000000000" pitchFamily="65" charset="-120"/>
               </a:rPr>
-              <a:t>           吳岳霖、林裕峰</a:t>
+              <a:t>、林裕峰</a:t>
             </a:r>
           </a:p>
         </p:txBody>
@@ -4183,7 +4190,7 @@
         </p:nvSpPr>
         <p:spPr>
           <a:xfrm>
-            <a:off x="4801586" y="17495453"/>
+            <a:off x="4863171" y="17261697"/>
             <a:ext cx="1755609" cy="784830"/>
           </a:xfrm>
           <a:prstGeom prst="rect">
@@ -4227,7 +4234,7 @@
         </p:nvSpPr>
         <p:spPr>
           <a:xfrm>
-            <a:off x="39228" y="18431355"/>
+            <a:off x="494989" y="18001425"/>
             <a:ext cx="11577080" cy="646331"/>
           </a:xfrm>
           <a:prstGeom prst="rect">
@@ -4275,7 +4282,7 @@
         </p:nvSpPr>
         <p:spPr>
           <a:xfrm>
-            <a:off x="0" y="23081691"/>
+            <a:off x="535911" y="22664891"/>
             <a:ext cx="10491975" cy="1200329"/>
           </a:xfrm>
           <a:prstGeom prst="rect">
@@ -4532,8 +4539,8 @@
         </p:nvSpPr>
         <p:spPr>
           <a:xfrm>
-            <a:off x="11461534" y="22145728"/>
-            <a:ext cx="10297927" cy="5632311"/>
+            <a:off x="12236705" y="22316511"/>
+            <a:ext cx="9099229" cy="6178614"/>
           </a:xfrm>
           <a:prstGeom prst="rect">
             <a:avLst/>
@@ -4546,9 +4553,7 @@
           </a:bodyPr>
           <a:lstStyle/>
           <a:p>
-            <a:pPr marL="457200" indent="-457200">
-              <a:buFont typeface="Arial" panose="020B0604020202020204" pitchFamily="34" charset="0"/>
-              <a:buChar char="•"/>
+            <a:pPr>
               <a:tabLst>
                 <a:tab pos="581660" algn="l"/>
                 <a:tab pos="1163320" algn="l"/>
@@ -4578,10 +4583,22 @@
                 <a:ea typeface="inherit"/>
                 <a:cs typeface="Times New Roman" panose="02020603050405020304" pitchFamily="18" charset="0"/>
               </a:rPr>
+              <a:t> </a:t>
+            </a:r>
+            <a:r>
+              <a:rPr lang="en-US" altLang="zh-TW" sz="3950" kern="0" dirty="0">
+                <a:solidFill>
+                  <a:srgbClr val="202124"/>
+                </a:solidFill>
+                <a:effectLst/>
+                <a:latin typeface="Times New Roman" panose="02020603050405020304" pitchFamily="18" charset="0"/>
+                <a:ea typeface="inherit"/>
+                <a:cs typeface="Times New Roman" panose="02020603050405020304" pitchFamily="18" charset="0"/>
+              </a:rPr>
               <a:t>The r</a:t>
             </a:r>
             <a:r>
-              <a:rPr lang="zh-TW" altLang="zh-TW" sz="4000" kern="0" dirty="0">
+              <a:rPr lang="zh-TW" altLang="zh-TW" sz="3950" kern="0" dirty="0">
                 <a:solidFill>
                   <a:srgbClr val="202124"/>
                 </a:solidFill>
@@ -4593,7 +4610,7 @@
               <a:t>esults shows that our EDM-RoBERTa model </a:t>
             </a:r>
             <a:r>
-              <a:rPr lang="en-US" altLang="zh-TW" sz="4000" kern="0" dirty="0">
+              <a:rPr lang="en-US" altLang="zh-TW" sz="3950" kern="0" dirty="0">
                 <a:solidFill>
                   <a:srgbClr val="202124"/>
                 </a:solidFill>
@@ -4605,7 +4622,7 @@
               <a:t>o</a:t>
             </a:r>
             <a:r>
-              <a:rPr lang="zh-TW" altLang="zh-TW" sz="4000" kern="0" dirty="0">
+              <a:rPr lang="zh-TW" altLang="zh-TW" sz="3950" kern="0" dirty="0">
                 <a:solidFill>
                   <a:srgbClr val="202124"/>
                 </a:solidFill>
@@ -4617,7 +4634,7 @@
               <a:t>btains</a:t>
             </a:r>
             <a:r>
-              <a:rPr lang="zh-TW" altLang="en-US" sz="4000" kern="0" dirty="0">
+              <a:rPr lang="zh-TW" altLang="en-US" sz="3950" kern="0" dirty="0">
                 <a:solidFill>
                   <a:srgbClr val="202124"/>
                 </a:solidFill>
@@ -4628,7 +4645,7 @@
               <a:t> </a:t>
             </a:r>
             <a:r>
-              <a:rPr lang="zh-TW" altLang="zh-TW" sz="4000" kern="0" dirty="0">
+              <a:rPr lang="zh-TW" altLang="zh-TW" sz="3950" kern="0" dirty="0">
                 <a:solidFill>
                   <a:srgbClr val="202124"/>
                 </a:solidFill>
@@ -4640,7 +4657,7 @@
               <a:t>more accurate prediction results than the </a:t>
             </a:r>
             <a:r>
-              <a:rPr lang="en-US" altLang="zh-TW" sz="4000" kern="0" dirty="0">
+              <a:rPr lang="en-US" altLang="zh-TW" sz="3950" kern="0" dirty="0">
                 <a:solidFill>
                   <a:srgbClr val="202124"/>
                 </a:solidFill>
@@ -4651,7 +4668,7 @@
               <a:t>o</a:t>
             </a:r>
             <a:r>
-              <a:rPr lang="zh-TW" altLang="zh-TW" sz="4000" kern="0" dirty="0">
+              <a:rPr lang="zh-TW" altLang="zh-TW" sz="3950" kern="0" dirty="0">
                 <a:solidFill>
                   <a:srgbClr val="202124"/>
                 </a:solidFill>
@@ -4663,7 +4680,7 @@
               <a:t>riginal Transformer model on word meaning analysis output, </a:t>
             </a:r>
             <a:r>
-              <a:rPr lang="en-US" altLang="zh-TW" sz="4000" kern="0" dirty="0">
+              <a:rPr lang="en-US" altLang="zh-TW" sz="3950" kern="0" dirty="0">
                 <a:solidFill>
                   <a:srgbClr val="202124"/>
                 </a:solidFill>
@@ -4675,7 +4692,7 @@
               <a:t>and thereby </a:t>
             </a:r>
             <a:r>
-              <a:rPr lang="zh-TW" altLang="zh-TW" sz="4000" kern="0" dirty="0">
+              <a:rPr lang="zh-TW" altLang="zh-TW" sz="3950" kern="0" dirty="0">
                 <a:solidFill>
                   <a:srgbClr val="202124"/>
                 </a:solidFill>
@@ -4687,7 +4704,7 @@
               <a:t>improving the </a:t>
             </a:r>
             <a:r>
-              <a:rPr lang="en-US" altLang="zh-TW" sz="4000" kern="0" dirty="0">
+              <a:rPr lang="en-US" altLang="zh-TW" sz="3950" kern="0" dirty="0">
                 <a:solidFill>
                   <a:srgbClr val="202124"/>
                 </a:solidFill>
@@ -4699,7 +4716,7 @@
               <a:t>short-dependency</a:t>
             </a:r>
             <a:r>
-              <a:rPr lang="zh-TW" altLang="zh-TW" sz="4000" kern="0" dirty="0">
+              <a:rPr lang="zh-TW" altLang="zh-TW" sz="3950" kern="0" dirty="0">
                 <a:solidFill>
                   <a:srgbClr val="202124"/>
                 </a:solidFill>
@@ -4711,7 +4728,7 @@
               <a:t> in </a:t>
             </a:r>
             <a:r>
-              <a:rPr lang="en-US" altLang="zh-TW" sz="4000" kern="0" dirty="0">
+              <a:rPr lang="en-US" altLang="zh-TW" sz="3950" kern="0" dirty="0">
                 <a:solidFill>
                   <a:srgbClr val="202124"/>
                 </a:solidFill>
@@ -4723,7 +4740,7 @@
               <a:t>the en</a:t>
             </a:r>
             <a:r>
-              <a:rPr lang="zh-TW" altLang="zh-TW" sz="4000" kern="0" dirty="0">
+              <a:rPr lang="zh-TW" altLang="zh-TW" sz="3950" kern="0" dirty="0">
                 <a:solidFill>
                   <a:srgbClr val="202124"/>
                 </a:solidFill>
@@ -4734,16 +4751,14 @@
               </a:rPr>
               <a:t>coding process.</a:t>
             </a:r>
-            <a:endParaRPr lang="en-US" altLang="zh-TW" sz="4000" kern="100" dirty="0">
+            <a:endParaRPr lang="en-US" altLang="zh-TW" sz="3950" kern="100" dirty="0">
               <a:latin typeface="Times New Roman" panose="02020603050405020304" pitchFamily="18" charset="0"/>
               <a:ea typeface="新細明體" panose="02020500000000000000" pitchFamily="18" charset="-120"/>
               <a:cs typeface="Times New Roman" panose="02020603050405020304" pitchFamily="18" charset="0"/>
             </a:endParaRPr>
           </a:p>
           <a:p>
-            <a:pPr marL="457200" indent="-457200">
-              <a:buFont typeface="Arial" panose="020B0604020202020204" pitchFamily="34" charset="0"/>
-              <a:buChar char="•"/>
+            <a:pPr>
               <a:tabLst>
                 <a:tab pos="581660" algn="l"/>
                 <a:tab pos="1163320" algn="l"/>
@@ -4764,7 +4779,19 @@
               </a:tabLst>
             </a:pPr>
             <a:r>
-              <a:rPr lang="zh-TW" altLang="zh-TW" sz="4000" kern="0" dirty="0">
+              <a:rPr lang="en-US" altLang="zh-TW" sz="3950" kern="0" dirty="0">
+                <a:solidFill>
+                  <a:srgbClr val="202124"/>
+                </a:solidFill>
+                <a:effectLst/>
+                <a:latin typeface="Times New Roman" panose="02020603050405020304" pitchFamily="18" charset="0"/>
+                <a:ea typeface="inherit"/>
+                <a:cs typeface="Times New Roman" panose="02020603050405020304" pitchFamily="18" charset="0"/>
+              </a:rPr>
+              <a:t> </a:t>
+            </a:r>
+            <a:r>
+              <a:rPr lang="zh-TW" altLang="zh-TW" sz="3950" kern="0" dirty="0">
                 <a:solidFill>
                   <a:srgbClr val="202124"/>
                 </a:solidFill>
@@ -4776,7 +4803,7 @@
               <a:t>The results will </a:t>
             </a:r>
             <a:r>
-              <a:rPr lang="en-US" altLang="zh-TW" sz="4000" kern="0" dirty="0">
+              <a:rPr lang="en-US" altLang="zh-TW" sz="3950" kern="0" dirty="0">
                 <a:solidFill>
                   <a:srgbClr val="202124"/>
                 </a:solidFill>
@@ -4788,7 +4815,7 @@
               <a:t>also </a:t>
             </a:r>
             <a:r>
-              <a:rPr lang="zh-TW" altLang="zh-TW" sz="4000" kern="0" dirty="0">
+              <a:rPr lang="zh-TW" altLang="zh-TW" sz="3950" kern="0" dirty="0">
                 <a:solidFill>
                   <a:srgbClr val="202124"/>
                 </a:solidFill>
@@ -4799,7 +4826,7 @@
               </a:rPr>
               <a:t>be applied to other natural language sentiment analysis tasks such as sentiment analysis and social network analysis.</a:t>
             </a:r>
-            <a:endParaRPr lang="zh-TW" altLang="zh-TW" sz="4000" kern="100" dirty="0">
+            <a:endParaRPr lang="zh-TW" altLang="zh-TW" sz="3950" kern="100" dirty="0">
               <a:effectLst/>
               <a:latin typeface="Times New Roman" panose="02020603050405020304" pitchFamily="18" charset="0"/>
               <a:ea typeface="新細明體" panose="02020500000000000000" pitchFamily="18" charset="-120"/>
@@ -5408,8 +5435,8 @@
         </p:blipFill>
         <p:spPr>
           <a:xfrm>
-            <a:off x="26537" y="24393112"/>
-            <a:ext cx="11434997" cy="3407722"/>
+            <a:off x="405566" y="24171152"/>
+            <a:ext cx="11988609" cy="3572703"/>
           </a:xfrm>
           <a:prstGeom prst="rect">
             <a:avLst/>
@@ -5438,8 +5465,8 @@
         </p:blipFill>
         <p:spPr>
           <a:xfrm>
-            <a:off x="74955" y="19191809"/>
-            <a:ext cx="11332045" cy="3407722"/>
+            <a:off x="535911" y="18786255"/>
+            <a:ext cx="11880678" cy="3572704"/>
           </a:xfrm>
           <a:prstGeom prst="rect">
             <a:avLst/>
@@ -5468,8 +5495,8 @@
         </p:blipFill>
         <p:spPr>
           <a:xfrm>
-            <a:off x="11178574" y="6160329"/>
-            <a:ext cx="10863845" cy="2563190"/>
+            <a:off x="11210816" y="6205301"/>
+            <a:ext cx="9957559" cy="2349363"/>
           </a:xfrm>
           <a:prstGeom prst="rect">
             <a:avLst/>

</xml_diff>